<commit_message>
added images and slides
</commit_message>
<xml_diff>
--- a/n-pro-20_testing.pptx
+++ b/n-pro-20_testing.pptx
@@ -5,11 +5,14 @@
     <p:sldMasterId id="2147483648" r:id="rId1"/>
   </p:sldMasterIdLst>
   <p:notesMasterIdLst>
-    <p:notesMasterId r:id="rId4"/>
+    <p:notesMasterId r:id="rId7"/>
   </p:notesMasterIdLst>
   <p:sldIdLst>
     <p:sldId id="256" r:id="rId2"/>
     <p:sldId id="257" r:id="rId3"/>
+    <p:sldId id="258" r:id="rId4"/>
+    <p:sldId id="259" r:id="rId5"/>
+    <p:sldId id="260" r:id="rId6"/>
   </p:sldIdLst>
   <p:sldSz cx="12192000" cy="6858000"/>
   <p:notesSz cx="6858000" cy="9144000"/>
@@ -198,7 +201,7 @@
           <a:p>
             <a:fld id="{A59324CB-7605-4AC4-99F1-F14FF5ADF06C}" type="datetimeFigureOut">
               <a:rPr lang="en-IE" smtClean="0"/>
-              <a:t>08/03/2021</a:t>
+              <a:t>09/03/2021</a:t>
             </a:fld>
             <a:endParaRPr lang="en-IE"/>
           </a:p>
@@ -550,6 +553,258 @@
 </p:notes>
 </file>
 
+<file path=ppt/notesSlides/notesSlide2.xml><?xml version="1.0" encoding="utf-8"?>
+<p:notes xmlns:a="http://schemas.openxmlformats.org/drawingml/2006/main" xmlns:r="http://schemas.openxmlformats.org/officeDocument/2006/relationships" xmlns:p="http://schemas.openxmlformats.org/presentationml/2006/main">
+  <p:cSld>
+    <p:spTree>
+      <p:nvGrpSpPr>
+        <p:cNvPr id="1" name=""/>
+        <p:cNvGrpSpPr/>
+        <p:nvPr/>
+      </p:nvGrpSpPr>
+      <p:grpSpPr>
+        <a:xfrm>
+          <a:off x="0" y="0"/>
+          <a:ext cx="0" cy="0"/>
+          <a:chOff x="0" y="0"/>
+          <a:chExt cx="0" cy="0"/>
+        </a:xfrm>
+      </p:grpSpPr>
+      <p:sp>
+        <p:nvSpPr>
+          <p:cNvPr id="2" name="Slide Image Placeholder 1"/>
+          <p:cNvSpPr>
+            <a:spLocks noGrp="1" noRot="1" noChangeAspect="1"/>
+          </p:cNvSpPr>
+          <p:nvPr>
+            <p:ph type="sldImg"/>
+          </p:nvPr>
+        </p:nvSpPr>
+        <p:spPr/>
+      </p:sp>
+      <p:sp>
+        <p:nvSpPr>
+          <p:cNvPr id="3" name="Notes Placeholder 2"/>
+          <p:cNvSpPr>
+            <a:spLocks noGrp="1"/>
+          </p:cNvSpPr>
+          <p:nvPr>
+            <p:ph type="body" idx="1"/>
+          </p:nvPr>
+        </p:nvSpPr>
+        <p:spPr/>
+        <p:txBody>
+          <a:bodyPr/>
+          <a:lstStyle/>
+          <a:p>
+            <a:endParaRPr lang="en-IE" dirty="0"/>
+          </a:p>
+        </p:txBody>
+      </p:sp>
+      <p:sp>
+        <p:nvSpPr>
+          <p:cNvPr id="4" name="Slide Number Placeholder 3"/>
+          <p:cNvSpPr>
+            <a:spLocks noGrp="1"/>
+          </p:cNvSpPr>
+          <p:nvPr>
+            <p:ph type="sldNum" sz="quarter" idx="5"/>
+          </p:nvPr>
+        </p:nvSpPr>
+        <p:spPr/>
+        <p:txBody>
+          <a:bodyPr/>
+          <a:lstStyle/>
+          <a:p>
+            <a:fld id="{068DBD27-D975-4498-A8B8-B819EF6BDC54}" type="slidenum">
+              <a:rPr lang="en-IE" smtClean="0"/>
+              <a:t>3</a:t>
+            </a:fld>
+            <a:endParaRPr lang="en-IE"/>
+          </a:p>
+        </p:txBody>
+      </p:sp>
+    </p:spTree>
+    <p:extLst>
+      <p:ext uri="{BB962C8B-B14F-4D97-AF65-F5344CB8AC3E}">
+        <p14:creationId xmlns:p14="http://schemas.microsoft.com/office/powerpoint/2010/main" val="3063493973"/>
+      </p:ext>
+    </p:extLst>
+  </p:cSld>
+  <p:clrMapOvr>
+    <a:masterClrMapping/>
+  </p:clrMapOvr>
+</p:notes>
+</file>
+
+<file path=ppt/notesSlides/notesSlide3.xml><?xml version="1.0" encoding="utf-8"?>
+<p:notes xmlns:a="http://schemas.openxmlformats.org/drawingml/2006/main" xmlns:r="http://schemas.openxmlformats.org/officeDocument/2006/relationships" xmlns:p="http://schemas.openxmlformats.org/presentationml/2006/main">
+  <p:cSld>
+    <p:spTree>
+      <p:nvGrpSpPr>
+        <p:cNvPr id="1" name=""/>
+        <p:cNvGrpSpPr/>
+        <p:nvPr/>
+      </p:nvGrpSpPr>
+      <p:grpSpPr>
+        <a:xfrm>
+          <a:off x="0" y="0"/>
+          <a:ext cx="0" cy="0"/>
+          <a:chOff x="0" y="0"/>
+          <a:chExt cx="0" cy="0"/>
+        </a:xfrm>
+      </p:grpSpPr>
+      <p:sp>
+        <p:nvSpPr>
+          <p:cNvPr id="2" name="Slide Image Placeholder 1"/>
+          <p:cNvSpPr>
+            <a:spLocks noGrp="1" noRot="1" noChangeAspect="1"/>
+          </p:cNvSpPr>
+          <p:nvPr>
+            <p:ph type="sldImg"/>
+          </p:nvPr>
+        </p:nvSpPr>
+        <p:spPr/>
+      </p:sp>
+      <p:sp>
+        <p:nvSpPr>
+          <p:cNvPr id="3" name="Notes Placeholder 2"/>
+          <p:cNvSpPr>
+            <a:spLocks noGrp="1"/>
+          </p:cNvSpPr>
+          <p:nvPr>
+            <p:ph type="body" idx="1"/>
+          </p:nvPr>
+        </p:nvSpPr>
+        <p:spPr/>
+        <p:txBody>
+          <a:bodyPr/>
+          <a:lstStyle/>
+          <a:p>
+            <a:endParaRPr lang="en-IE" dirty="0"/>
+          </a:p>
+        </p:txBody>
+      </p:sp>
+      <p:sp>
+        <p:nvSpPr>
+          <p:cNvPr id="4" name="Slide Number Placeholder 3"/>
+          <p:cNvSpPr>
+            <a:spLocks noGrp="1"/>
+          </p:cNvSpPr>
+          <p:nvPr>
+            <p:ph type="sldNum" sz="quarter" idx="5"/>
+          </p:nvPr>
+        </p:nvSpPr>
+        <p:spPr/>
+        <p:txBody>
+          <a:bodyPr/>
+          <a:lstStyle/>
+          <a:p>
+            <a:fld id="{068DBD27-D975-4498-A8B8-B819EF6BDC54}" type="slidenum">
+              <a:rPr lang="en-IE" smtClean="0"/>
+              <a:t>4</a:t>
+            </a:fld>
+            <a:endParaRPr lang="en-IE"/>
+          </a:p>
+        </p:txBody>
+      </p:sp>
+    </p:spTree>
+    <p:extLst>
+      <p:ext uri="{BB962C8B-B14F-4D97-AF65-F5344CB8AC3E}">
+        <p14:creationId xmlns:p14="http://schemas.microsoft.com/office/powerpoint/2010/main" val="2489775138"/>
+      </p:ext>
+    </p:extLst>
+  </p:cSld>
+  <p:clrMapOvr>
+    <a:masterClrMapping/>
+  </p:clrMapOvr>
+</p:notes>
+</file>
+
+<file path=ppt/notesSlides/notesSlide4.xml><?xml version="1.0" encoding="utf-8"?>
+<p:notes xmlns:a="http://schemas.openxmlformats.org/drawingml/2006/main" xmlns:r="http://schemas.openxmlformats.org/officeDocument/2006/relationships" xmlns:p="http://schemas.openxmlformats.org/presentationml/2006/main">
+  <p:cSld>
+    <p:spTree>
+      <p:nvGrpSpPr>
+        <p:cNvPr id="1" name=""/>
+        <p:cNvGrpSpPr/>
+        <p:nvPr/>
+      </p:nvGrpSpPr>
+      <p:grpSpPr>
+        <a:xfrm>
+          <a:off x="0" y="0"/>
+          <a:ext cx="0" cy="0"/>
+          <a:chOff x="0" y="0"/>
+          <a:chExt cx="0" cy="0"/>
+        </a:xfrm>
+      </p:grpSpPr>
+      <p:sp>
+        <p:nvSpPr>
+          <p:cNvPr id="2" name="Slide Image Placeholder 1"/>
+          <p:cNvSpPr>
+            <a:spLocks noGrp="1" noRot="1" noChangeAspect="1"/>
+          </p:cNvSpPr>
+          <p:nvPr>
+            <p:ph type="sldImg"/>
+          </p:nvPr>
+        </p:nvSpPr>
+        <p:spPr/>
+      </p:sp>
+      <p:sp>
+        <p:nvSpPr>
+          <p:cNvPr id="3" name="Notes Placeholder 2"/>
+          <p:cNvSpPr>
+            <a:spLocks noGrp="1"/>
+          </p:cNvSpPr>
+          <p:nvPr>
+            <p:ph type="body" idx="1"/>
+          </p:nvPr>
+        </p:nvSpPr>
+        <p:spPr/>
+        <p:txBody>
+          <a:bodyPr/>
+          <a:lstStyle/>
+          <a:p>
+            <a:endParaRPr lang="en-IE" dirty="0"/>
+          </a:p>
+        </p:txBody>
+      </p:sp>
+      <p:sp>
+        <p:nvSpPr>
+          <p:cNvPr id="4" name="Slide Number Placeholder 3"/>
+          <p:cNvSpPr>
+            <a:spLocks noGrp="1"/>
+          </p:cNvSpPr>
+          <p:nvPr>
+            <p:ph type="sldNum" sz="quarter" idx="5"/>
+          </p:nvPr>
+        </p:nvSpPr>
+        <p:spPr/>
+        <p:txBody>
+          <a:bodyPr/>
+          <a:lstStyle/>
+          <a:p>
+            <a:fld id="{068DBD27-D975-4498-A8B8-B819EF6BDC54}" type="slidenum">
+              <a:rPr lang="en-IE" smtClean="0"/>
+              <a:t>5</a:t>
+            </a:fld>
+            <a:endParaRPr lang="en-IE"/>
+          </a:p>
+        </p:txBody>
+      </p:sp>
+    </p:spTree>
+    <p:extLst>
+      <p:ext uri="{BB962C8B-B14F-4D97-AF65-F5344CB8AC3E}">
+        <p14:creationId xmlns:p14="http://schemas.microsoft.com/office/powerpoint/2010/main" val="3096842615"/>
+      </p:ext>
+    </p:extLst>
+  </p:cSld>
+  <p:clrMapOvr>
+    <a:masterClrMapping/>
+  </p:clrMapOvr>
+</p:notes>
+</file>
+
 <file path=ppt/slideLayouts/slideLayout1.xml><?xml version="1.0" encoding="utf-8"?>
 <p:sldLayout xmlns:a="http://schemas.openxmlformats.org/drawingml/2006/main" xmlns:r="http://schemas.openxmlformats.org/officeDocument/2006/relationships" xmlns:p="http://schemas.openxmlformats.org/presentationml/2006/main" type="title" preserve="1">
   <p:cSld name="Title Slide">
@@ -699,7 +954,7 @@
           <a:p>
             <a:fld id="{3C19E557-3708-47BF-AE74-75708A6E8876}" type="datetimeFigureOut">
               <a:rPr lang="en-IE" smtClean="0"/>
-              <a:t>08/03/2021</a:t>
+              <a:t>09/03/2021</a:t>
             </a:fld>
             <a:endParaRPr lang="en-IE"/>
           </a:p>
@@ -899,7 +1154,7 @@
           <a:p>
             <a:fld id="{3C19E557-3708-47BF-AE74-75708A6E8876}" type="datetimeFigureOut">
               <a:rPr lang="en-IE" smtClean="0"/>
-              <a:t>08/03/2021</a:t>
+              <a:t>09/03/2021</a:t>
             </a:fld>
             <a:endParaRPr lang="en-IE"/>
           </a:p>
@@ -1109,7 +1364,7 @@
           <a:p>
             <a:fld id="{3C19E557-3708-47BF-AE74-75708A6E8876}" type="datetimeFigureOut">
               <a:rPr lang="en-IE" smtClean="0"/>
-              <a:t>08/03/2021</a:t>
+              <a:t>09/03/2021</a:t>
             </a:fld>
             <a:endParaRPr lang="en-IE"/>
           </a:p>
@@ -1309,7 +1564,7 @@
           <a:p>
             <a:fld id="{3C19E557-3708-47BF-AE74-75708A6E8876}" type="datetimeFigureOut">
               <a:rPr lang="en-IE" smtClean="0"/>
-              <a:t>08/03/2021</a:t>
+              <a:t>09/03/2021</a:t>
             </a:fld>
             <a:endParaRPr lang="en-IE"/>
           </a:p>
@@ -1585,7 +1840,7 @@
           <a:p>
             <a:fld id="{3C19E557-3708-47BF-AE74-75708A6E8876}" type="datetimeFigureOut">
               <a:rPr lang="en-IE" smtClean="0"/>
-              <a:t>08/03/2021</a:t>
+              <a:t>09/03/2021</a:t>
             </a:fld>
             <a:endParaRPr lang="en-IE"/>
           </a:p>
@@ -1853,7 +2108,7 @@
           <a:p>
             <a:fld id="{3C19E557-3708-47BF-AE74-75708A6E8876}" type="datetimeFigureOut">
               <a:rPr lang="en-IE" smtClean="0"/>
-              <a:t>08/03/2021</a:t>
+              <a:t>09/03/2021</a:t>
             </a:fld>
             <a:endParaRPr lang="en-IE"/>
           </a:p>
@@ -2268,7 +2523,7 @@
           <a:p>
             <a:fld id="{3C19E557-3708-47BF-AE74-75708A6E8876}" type="datetimeFigureOut">
               <a:rPr lang="en-IE" smtClean="0"/>
-              <a:t>08/03/2021</a:t>
+              <a:t>09/03/2021</a:t>
             </a:fld>
             <a:endParaRPr lang="en-IE"/>
           </a:p>
@@ -2410,7 +2665,7 @@
           <a:p>
             <a:fld id="{3C19E557-3708-47BF-AE74-75708A6E8876}" type="datetimeFigureOut">
               <a:rPr lang="en-IE" smtClean="0"/>
-              <a:t>08/03/2021</a:t>
+              <a:t>09/03/2021</a:t>
             </a:fld>
             <a:endParaRPr lang="en-IE"/>
           </a:p>
@@ -2523,7 +2778,7 @@
           <a:p>
             <a:fld id="{3C19E557-3708-47BF-AE74-75708A6E8876}" type="datetimeFigureOut">
               <a:rPr lang="en-IE" smtClean="0"/>
-              <a:t>08/03/2021</a:t>
+              <a:t>09/03/2021</a:t>
             </a:fld>
             <a:endParaRPr lang="en-IE"/>
           </a:p>
@@ -2836,7 +3091,7 @@
           <a:p>
             <a:fld id="{3C19E557-3708-47BF-AE74-75708A6E8876}" type="datetimeFigureOut">
               <a:rPr lang="en-IE" smtClean="0"/>
-              <a:t>08/03/2021</a:t>
+              <a:t>09/03/2021</a:t>
             </a:fld>
             <a:endParaRPr lang="en-IE"/>
           </a:p>
@@ -3125,7 +3380,7 @@
           <a:p>
             <a:fld id="{3C19E557-3708-47BF-AE74-75708A6E8876}" type="datetimeFigureOut">
               <a:rPr lang="en-IE" smtClean="0"/>
-              <a:t>08/03/2021</a:t>
+              <a:t>09/03/2021</a:t>
             </a:fld>
             <a:endParaRPr lang="en-IE"/>
           </a:p>
@@ -3368,7 +3623,7 @@
           <a:p>
             <a:fld id="{3C19E557-3708-47BF-AE74-75708A6E8876}" type="datetimeFigureOut">
               <a:rPr lang="en-IE" smtClean="0"/>
-              <a:t>08/03/2021</a:t>
+              <a:t>09/03/2021</a:t>
             </a:fld>
             <a:endParaRPr lang="en-IE"/>
           </a:p>
@@ -3894,7 +4149,7 @@
             <a:pPr algn="ctr"/>
             <a:r>
               <a:rPr lang="en-US" dirty="0"/>
-              <a:t>AT commands UART</a:t>
+              <a:t>UARTs</a:t>
             </a:r>
             <a:endParaRPr lang="en-IE" dirty="0"/>
           </a:p>
@@ -3988,7 +4243,7 @@
         </p:nvSpPr>
         <p:spPr>
           <a:xfrm>
-            <a:off x="7599640" y="2939594"/>
+            <a:off x="7599640" y="2988822"/>
             <a:ext cx="528799" cy="369332"/>
           </a:xfrm>
           <a:prstGeom prst="rect">
@@ -4068,7 +4323,7 @@
         </p:nvSpPr>
         <p:spPr>
           <a:xfrm>
-            <a:off x="7599640" y="3410524"/>
+            <a:off x="7622689" y="3347744"/>
             <a:ext cx="551754" cy="369332"/>
           </a:xfrm>
           <a:prstGeom prst="rect">
@@ -4188,7 +4443,7 @@
         </p:nvSpPr>
         <p:spPr>
           <a:xfrm>
-            <a:off x="9054652" y="2704457"/>
+            <a:off x="8625083" y="2729060"/>
             <a:ext cx="1318887" cy="369332"/>
           </a:xfrm>
           <a:prstGeom prst="rect">
@@ -4515,7 +4770,7 @@
         </p:nvSpPr>
         <p:spPr>
           <a:xfrm>
-            <a:off x="7599640" y="1903700"/>
+            <a:off x="7595746" y="1960484"/>
             <a:ext cx="528799" cy="369332"/>
           </a:xfrm>
           <a:prstGeom prst="rect">
@@ -4595,7 +4850,7 @@
         </p:nvSpPr>
         <p:spPr>
           <a:xfrm>
-            <a:off x="7599640" y="2374630"/>
+            <a:off x="7599640" y="2316694"/>
             <a:ext cx="551754" cy="369332"/>
           </a:xfrm>
           <a:prstGeom prst="rect">
@@ -4712,6 +4967,561 @@
     <p:extLst>
       <p:ext uri="{BB962C8B-B14F-4D97-AF65-F5344CB8AC3E}">
         <p14:creationId xmlns:p14="http://schemas.microsoft.com/office/powerpoint/2010/main" val="945476031"/>
+      </p:ext>
+    </p:extLst>
+  </p:cSld>
+  <p:clrMapOvr>
+    <a:masterClrMapping/>
+  </p:clrMapOvr>
+</p:sld>
+</file>
+
+<file path=ppt/slides/slide3.xml><?xml version="1.0" encoding="utf-8"?>
+<p:sld xmlns:a="http://schemas.openxmlformats.org/drawingml/2006/main" xmlns:r="http://schemas.openxmlformats.org/officeDocument/2006/relationships" xmlns:p="http://schemas.openxmlformats.org/presentationml/2006/main">
+  <p:cSld>
+    <p:spTree>
+      <p:nvGrpSpPr>
+        <p:cNvPr id="1" name=""/>
+        <p:cNvGrpSpPr/>
+        <p:nvPr/>
+      </p:nvGrpSpPr>
+      <p:grpSpPr>
+        <a:xfrm>
+          <a:off x="0" y="0"/>
+          <a:ext cx="0" cy="0"/>
+          <a:chOff x="0" y="0"/>
+          <a:chExt cx="0" cy="0"/>
+        </a:xfrm>
+      </p:grpSpPr>
+      <p:sp>
+        <p:nvSpPr>
+          <p:cNvPr id="2" name="Title 1">
+            <a:extLst>
+              <a:ext uri="{FF2B5EF4-FFF2-40B4-BE49-F238E27FC236}">
+                <a16:creationId xmlns:a16="http://schemas.microsoft.com/office/drawing/2014/main" id="{9A0B84F3-1828-4464-9B21-B7594ACC4A2F}"/>
+              </a:ext>
+            </a:extLst>
+          </p:cNvPr>
+          <p:cNvSpPr>
+            <a:spLocks noGrp="1"/>
+          </p:cNvSpPr>
+          <p:nvPr>
+            <p:ph type="title"/>
+          </p:nvPr>
+        </p:nvSpPr>
+        <p:spPr>
+          <a:xfrm>
+            <a:off x="0" y="4908"/>
+            <a:ext cx="12192000" cy="759402"/>
+          </a:xfrm>
+        </p:spPr>
+        <p:txBody>
+          <a:bodyPr/>
+          <a:lstStyle/>
+          <a:p>
+            <a:pPr algn="ctr"/>
+            <a:r>
+              <a:rPr lang="en-US" dirty="0"/>
+              <a:t>Tera-term setup</a:t>
+            </a:r>
+            <a:endParaRPr lang="en-IE" dirty="0"/>
+          </a:p>
+        </p:txBody>
+      </p:sp>
+      <p:pic>
+        <p:nvPicPr>
+          <p:cNvPr id="11" name="Picture 10" descr="Graphical user interface&#10;&#10;Description automatically generated">
+            <a:extLst>
+              <a:ext uri="{FF2B5EF4-FFF2-40B4-BE49-F238E27FC236}">
+                <a16:creationId xmlns:a16="http://schemas.microsoft.com/office/drawing/2014/main" id="{8516DA38-5A82-4E5D-8CFA-81DD07E4488C}"/>
+              </a:ext>
+            </a:extLst>
+          </p:cNvPr>
+          <p:cNvPicPr>
+            <a:picLocks noChangeAspect="1"/>
+          </p:cNvPicPr>
+          <p:nvPr/>
+        </p:nvPicPr>
+        <p:blipFill>
+          <a:blip r:embed="rId3">
+            <a:extLst>
+              <a:ext uri="{28A0092B-C50C-407E-A947-70E740481C1C}">
+                <a14:useLocalDpi xmlns:a14="http://schemas.microsoft.com/office/drawing/2010/main" val="0"/>
+              </a:ext>
+            </a:extLst>
+          </a:blip>
+          <a:stretch>
+            <a:fillRect/>
+          </a:stretch>
+        </p:blipFill>
+        <p:spPr>
+          <a:xfrm>
+            <a:off x="1064782" y="1154465"/>
+            <a:ext cx="4094390" cy="3342139"/>
+          </a:xfrm>
+          <a:prstGeom prst="rect">
+            <a:avLst/>
+          </a:prstGeom>
+        </p:spPr>
+      </p:pic>
+      <p:pic>
+        <p:nvPicPr>
+          <p:cNvPr id="13" name="Picture 12" descr="Graphical user interface, application&#10;&#10;Description automatically generated">
+            <a:extLst>
+              <a:ext uri="{FF2B5EF4-FFF2-40B4-BE49-F238E27FC236}">
+                <a16:creationId xmlns:a16="http://schemas.microsoft.com/office/drawing/2014/main" id="{4B6668C4-A5BC-457B-876F-0C7F08B4B832}"/>
+              </a:ext>
+            </a:extLst>
+          </p:cNvPr>
+          <p:cNvPicPr>
+            <a:picLocks noChangeAspect="1"/>
+          </p:cNvPicPr>
+          <p:nvPr/>
+        </p:nvPicPr>
+        <p:blipFill>
+          <a:blip r:embed="rId4">
+            <a:extLst>
+              <a:ext uri="{28A0092B-C50C-407E-A947-70E740481C1C}">
+                <a14:useLocalDpi xmlns:a14="http://schemas.microsoft.com/office/drawing/2010/main" val="0"/>
+              </a:ext>
+            </a:extLst>
+          </a:blip>
+          <a:stretch>
+            <a:fillRect/>
+          </a:stretch>
+        </p:blipFill>
+        <p:spPr>
+          <a:xfrm>
+            <a:off x="6024978" y="1077643"/>
+            <a:ext cx="5329238" cy="3418961"/>
+          </a:xfrm>
+          <a:prstGeom prst="rect">
+            <a:avLst/>
+          </a:prstGeom>
+        </p:spPr>
+      </p:pic>
+      <p:sp>
+        <p:nvSpPr>
+          <p:cNvPr id="15" name="TextBox 14">
+            <a:extLst>
+              <a:ext uri="{FF2B5EF4-FFF2-40B4-BE49-F238E27FC236}">
+                <a16:creationId xmlns:a16="http://schemas.microsoft.com/office/drawing/2014/main" id="{D075CBC1-5D9E-4DCE-BCB2-11325C1EC3FA}"/>
+              </a:ext>
+            </a:extLst>
+          </p:cNvPr>
+          <p:cNvSpPr txBox="1"/>
+          <p:nvPr/>
+        </p:nvSpPr>
+        <p:spPr>
+          <a:xfrm>
+            <a:off x="3950563" y="5335479"/>
+            <a:ext cx="2905604" cy="1200329"/>
+          </a:xfrm>
+          <a:prstGeom prst="rect">
+            <a:avLst/>
+          </a:prstGeom>
+          <a:noFill/>
+        </p:spPr>
+        <p:txBody>
+          <a:bodyPr wrap="none" rtlCol="0">
+            <a:spAutoFit/>
+          </a:bodyPr>
+          <a:lstStyle/>
+          <a:p>
+            <a:r>
+              <a:rPr lang="en-US" dirty="0"/>
+              <a:t>Important:</a:t>
+            </a:r>
+          </a:p>
+          <a:p>
+            <a:pPr marL="285750" indent="-285750">
+              <a:buFont typeface="Arial" panose="020B0604020202020204" pitchFamily="34" charset="0"/>
+              <a:buChar char="•"/>
+            </a:pPr>
+            <a:r>
+              <a:rPr lang="en-US" dirty="0"/>
+              <a:t>The serial port settings</a:t>
+            </a:r>
+          </a:p>
+          <a:p>
+            <a:pPr marL="285750" indent="-285750">
+              <a:buFont typeface="Arial" panose="020B0604020202020204" pitchFamily="34" charset="0"/>
+              <a:buChar char="•"/>
+            </a:pPr>
+            <a:r>
+              <a:rPr lang="en-US" dirty="0"/>
+              <a:t>NO Local echo</a:t>
+            </a:r>
+          </a:p>
+          <a:p>
+            <a:pPr marL="285750" indent="-285750">
+              <a:buFont typeface="Arial" panose="020B0604020202020204" pitchFamily="34" charset="0"/>
+              <a:buChar char="•"/>
+            </a:pPr>
+            <a:r>
+              <a:rPr lang="en-US" dirty="0"/>
+              <a:t>New-Line Transmit: CR+LF</a:t>
+            </a:r>
+            <a:endParaRPr lang="en-IE" dirty="0"/>
+          </a:p>
+        </p:txBody>
+      </p:sp>
+    </p:spTree>
+    <p:extLst>
+      <p:ext uri="{BB962C8B-B14F-4D97-AF65-F5344CB8AC3E}">
+        <p14:creationId xmlns:p14="http://schemas.microsoft.com/office/powerpoint/2010/main" val="699967266"/>
+      </p:ext>
+    </p:extLst>
+  </p:cSld>
+  <p:clrMapOvr>
+    <a:masterClrMapping/>
+  </p:clrMapOvr>
+</p:sld>
+</file>
+
+<file path=ppt/slides/slide4.xml><?xml version="1.0" encoding="utf-8"?>
+<p:sld xmlns:a="http://schemas.openxmlformats.org/drawingml/2006/main" xmlns:r="http://schemas.openxmlformats.org/officeDocument/2006/relationships" xmlns:p="http://schemas.openxmlformats.org/presentationml/2006/main">
+  <p:cSld>
+    <p:spTree>
+      <p:nvGrpSpPr>
+        <p:cNvPr id="1" name=""/>
+        <p:cNvGrpSpPr/>
+        <p:nvPr/>
+      </p:nvGrpSpPr>
+      <p:grpSpPr>
+        <a:xfrm>
+          <a:off x="0" y="0"/>
+          <a:ext cx="0" cy="0"/>
+          <a:chOff x="0" y="0"/>
+          <a:chExt cx="0" cy="0"/>
+        </a:xfrm>
+      </p:grpSpPr>
+      <p:sp>
+        <p:nvSpPr>
+          <p:cNvPr id="2" name="Title 1">
+            <a:extLst>
+              <a:ext uri="{FF2B5EF4-FFF2-40B4-BE49-F238E27FC236}">
+                <a16:creationId xmlns:a16="http://schemas.microsoft.com/office/drawing/2014/main" id="{9A0B84F3-1828-4464-9B21-B7594ACC4A2F}"/>
+              </a:ext>
+            </a:extLst>
+          </p:cNvPr>
+          <p:cNvSpPr>
+            <a:spLocks noGrp="1"/>
+          </p:cNvSpPr>
+          <p:nvPr>
+            <p:ph type="title"/>
+          </p:nvPr>
+        </p:nvSpPr>
+        <p:spPr>
+          <a:xfrm>
+            <a:off x="0" y="4908"/>
+            <a:ext cx="12192000" cy="759402"/>
+          </a:xfrm>
+        </p:spPr>
+        <p:txBody>
+          <a:bodyPr/>
+          <a:lstStyle/>
+          <a:p>
+            <a:pPr algn="ctr"/>
+            <a:r>
+              <a:rPr lang="en-US" dirty="0"/>
+              <a:t>Modem response</a:t>
+            </a:r>
+            <a:endParaRPr lang="en-IE" dirty="0"/>
+          </a:p>
+        </p:txBody>
+      </p:sp>
+      <p:pic>
+        <p:nvPicPr>
+          <p:cNvPr id="8" name="Picture 7" descr="A screenshot of a computer&#10;&#10;Description automatically generated with medium confidence">
+            <a:extLst>
+              <a:ext uri="{FF2B5EF4-FFF2-40B4-BE49-F238E27FC236}">
+                <a16:creationId xmlns:a16="http://schemas.microsoft.com/office/drawing/2014/main" id="{784E99B6-B7F9-4045-8E08-3D313129393E}"/>
+              </a:ext>
+            </a:extLst>
+          </p:cNvPr>
+          <p:cNvPicPr>
+            <a:picLocks noChangeAspect="1"/>
+          </p:cNvPicPr>
+          <p:nvPr/>
+        </p:nvPicPr>
+        <p:blipFill>
+          <a:blip r:embed="rId3">
+            <a:extLst>
+              <a:ext uri="{28A0092B-C50C-407E-A947-70E740481C1C}">
+                <a14:useLocalDpi xmlns:a14="http://schemas.microsoft.com/office/drawing/2010/main" val="0"/>
+              </a:ext>
+            </a:extLst>
+          </a:blip>
+          <a:stretch>
+            <a:fillRect/>
+          </a:stretch>
+        </p:blipFill>
+        <p:spPr>
+          <a:xfrm>
+            <a:off x="3373516" y="1580225"/>
+            <a:ext cx="4886960" cy="3442276"/>
+          </a:xfrm>
+          <a:prstGeom prst="rect">
+            <a:avLst/>
+          </a:prstGeom>
+        </p:spPr>
+      </p:pic>
+      <p:sp>
+        <p:nvSpPr>
+          <p:cNvPr id="7" name="TextBox 6">
+            <a:extLst>
+              <a:ext uri="{FF2B5EF4-FFF2-40B4-BE49-F238E27FC236}">
+                <a16:creationId xmlns:a16="http://schemas.microsoft.com/office/drawing/2014/main" id="{F2D7EB13-54B6-4506-9FD8-5F553D5CB58B}"/>
+              </a:ext>
+            </a:extLst>
+          </p:cNvPr>
+          <p:cNvSpPr txBox="1"/>
+          <p:nvPr/>
+        </p:nvSpPr>
+        <p:spPr>
+          <a:xfrm>
+            <a:off x="1979721" y="5763946"/>
+            <a:ext cx="9298186" cy="646331"/>
+          </a:xfrm>
+          <a:prstGeom prst="rect">
+            <a:avLst/>
+          </a:prstGeom>
+          <a:noFill/>
+        </p:spPr>
+        <p:txBody>
+          <a:bodyPr wrap="none" rtlCol="0">
+            <a:spAutoFit/>
+          </a:bodyPr>
+          <a:lstStyle/>
+          <a:p>
+            <a:pPr marL="285750" indent="-285750">
+              <a:buFont typeface="Arial" panose="020B0604020202020204" pitchFamily="34" charset="0"/>
+              <a:buChar char="•"/>
+            </a:pPr>
+            <a:r>
+              <a:rPr lang="en-US" dirty="0"/>
+              <a:t>The simplest test for testing the Modem AT-Commands is to send from the terminal: AT [CRLF]</a:t>
+            </a:r>
+          </a:p>
+          <a:p>
+            <a:pPr marL="285750" indent="-285750">
+              <a:buFont typeface="Arial" panose="020B0604020202020204" pitchFamily="34" charset="0"/>
+              <a:buChar char="•"/>
+            </a:pPr>
+            <a:r>
+              <a:rPr lang="en-US" dirty="0"/>
+              <a:t>The Terminal must be setup to send </a:t>
+            </a:r>
+            <a:r>
+              <a:rPr lang="en-US" b="1" dirty="0"/>
+              <a:t>both CR and LF </a:t>
+            </a:r>
+            <a:r>
+              <a:rPr lang="en-US" dirty="0"/>
+              <a:t>when pressing the button ‘ENTER’</a:t>
+            </a:r>
+            <a:endParaRPr lang="en-IE" dirty="0"/>
+          </a:p>
+        </p:txBody>
+      </p:sp>
+    </p:spTree>
+    <p:extLst>
+      <p:ext uri="{BB962C8B-B14F-4D97-AF65-F5344CB8AC3E}">
+        <p14:creationId xmlns:p14="http://schemas.microsoft.com/office/powerpoint/2010/main" val="1496528728"/>
+      </p:ext>
+    </p:extLst>
+  </p:cSld>
+  <p:clrMapOvr>
+    <a:masterClrMapping/>
+  </p:clrMapOvr>
+</p:sld>
+</file>
+
+<file path=ppt/slides/slide5.xml><?xml version="1.0" encoding="utf-8"?>
+<p:sld xmlns:a="http://schemas.openxmlformats.org/drawingml/2006/main" xmlns:r="http://schemas.openxmlformats.org/officeDocument/2006/relationships" xmlns:p="http://schemas.openxmlformats.org/presentationml/2006/main">
+  <p:cSld>
+    <p:spTree>
+      <p:nvGrpSpPr>
+        <p:cNvPr id="1" name=""/>
+        <p:cNvGrpSpPr/>
+        <p:nvPr/>
+      </p:nvGrpSpPr>
+      <p:grpSpPr>
+        <a:xfrm>
+          <a:off x="0" y="0"/>
+          <a:ext cx="0" cy="0"/>
+          <a:chOff x="0" y="0"/>
+          <a:chExt cx="0" cy="0"/>
+        </a:xfrm>
+      </p:grpSpPr>
+      <p:sp>
+        <p:nvSpPr>
+          <p:cNvPr id="2" name="Title 1">
+            <a:extLst>
+              <a:ext uri="{FF2B5EF4-FFF2-40B4-BE49-F238E27FC236}">
+                <a16:creationId xmlns:a16="http://schemas.microsoft.com/office/drawing/2014/main" id="{9A0B84F3-1828-4464-9B21-B7594ACC4A2F}"/>
+              </a:ext>
+            </a:extLst>
+          </p:cNvPr>
+          <p:cNvSpPr>
+            <a:spLocks noGrp="1"/>
+          </p:cNvSpPr>
+          <p:nvPr>
+            <p:ph type="title"/>
+          </p:nvPr>
+        </p:nvSpPr>
+        <p:spPr>
+          <a:xfrm>
+            <a:off x="0" y="4908"/>
+            <a:ext cx="12192000" cy="759402"/>
+          </a:xfrm>
+        </p:spPr>
+        <p:txBody>
+          <a:bodyPr/>
+          <a:lstStyle/>
+          <a:p>
+            <a:pPr algn="ctr"/>
+            <a:r>
+              <a:rPr lang="en-US" dirty="0"/>
+              <a:t>Automatic connection to Wi-Fi Access Point</a:t>
+            </a:r>
+            <a:endParaRPr lang="en-IE" dirty="0"/>
+          </a:p>
+        </p:txBody>
+      </p:sp>
+      <p:pic>
+        <p:nvPicPr>
+          <p:cNvPr id="4" name="Picture 3" descr="Graphical user interface, text, application&#10;&#10;Description automatically generated">
+            <a:extLst>
+              <a:ext uri="{FF2B5EF4-FFF2-40B4-BE49-F238E27FC236}">
+                <a16:creationId xmlns:a16="http://schemas.microsoft.com/office/drawing/2014/main" id="{43DF20FC-1DDA-4032-88F3-B62DE4543ED2}"/>
+              </a:ext>
+            </a:extLst>
+          </p:cNvPr>
+          <p:cNvPicPr>
+            <a:picLocks noChangeAspect="1"/>
+          </p:cNvPicPr>
+          <p:nvPr/>
+        </p:nvPicPr>
+        <p:blipFill>
+          <a:blip r:embed="rId3">
+            <a:extLst>
+              <a:ext uri="{28A0092B-C50C-407E-A947-70E740481C1C}">
+                <a14:useLocalDpi xmlns:a14="http://schemas.microsoft.com/office/drawing/2010/main" val="0"/>
+              </a:ext>
+            </a:extLst>
+          </a:blip>
+          <a:stretch>
+            <a:fillRect/>
+          </a:stretch>
+        </p:blipFill>
+        <p:spPr>
+          <a:xfrm>
+            <a:off x="6903539" y="1565482"/>
+            <a:ext cx="4506930" cy="3302492"/>
+          </a:xfrm>
+          <a:prstGeom prst="rect">
+            <a:avLst/>
+          </a:prstGeom>
+        </p:spPr>
+      </p:pic>
+      <p:sp>
+        <p:nvSpPr>
+          <p:cNvPr id="3" name="TextBox 2">
+            <a:extLst>
+              <a:ext uri="{FF2B5EF4-FFF2-40B4-BE49-F238E27FC236}">
+                <a16:creationId xmlns:a16="http://schemas.microsoft.com/office/drawing/2014/main" id="{A0A65DB3-F600-4563-BC24-2400C9031BE3}"/>
+              </a:ext>
+            </a:extLst>
+          </p:cNvPr>
+          <p:cNvSpPr txBox="1"/>
+          <p:nvPr/>
+        </p:nvSpPr>
+        <p:spPr>
+          <a:xfrm>
+            <a:off x="1118587" y="5586393"/>
+            <a:ext cx="10156435" cy="646331"/>
+          </a:xfrm>
+          <a:prstGeom prst="rect">
+            <a:avLst/>
+          </a:prstGeom>
+          <a:noFill/>
+        </p:spPr>
+        <p:txBody>
+          <a:bodyPr wrap="none" rtlCol="0">
+            <a:spAutoFit/>
+          </a:bodyPr>
+          <a:lstStyle/>
+          <a:p>
+            <a:pPr marL="285750" indent="-285750">
+              <a:buFont typeface="Arial" panose="020B0604020202020204" pitchFamily="34" charset="0"/>
+              <a:buChar char="•"/>
+            </a:pPr>
+            <a:r>
+              <a:rPr lang="en-US" dirty="0"/>
+              <a:t>After setting the </a:t>
+            </a:r>
+            <a:r>
+              <a:rPr lang="en-US" dirty="0" err="1"/>
+              <a:t>ssid</a:t>
+            </a:r>
+            <a:r>
+              <a:rPr lang="en-US" dirty="0"/>
+              <a:t> credentials for the first time, the Modem stores them in NV memory</a:t>
+            </a:r>
+          </a:p>
+          <a:p>
+            <a:pPr marL="285750" indent="-285750">
+              <a:buFont typeface="Arial" panose="020B0604020202020204" pitchFamily="34" charset="0"/>
+              <a:buChar char="•"/>
+            </a:pPr>
+            <a:r>
+              <a:rPr lang="en-US" b="1" dirty="0"/>
+              <a:t>With Reset </a:t>
+            </a:r>
+            <a:r>
+              <a:rPr lang="en-US" dirty="0"/>
+              <a:t>(Reset Button or Power-on) the Modem is automatically connected to the Wi-Fi Access Point</a:t>
+            </a:r>
+            <a:endParaRPr lang="en-IE" dirty="0"/>
+          </a:p>
+        </p:txBody>
+      </p:sp>
+      <p:pic>
+        <p:nvPicPr>
+          <p:cNvPr id="6" name="Picture 5">
+            <a:extLst>
+              <a:ext uri="{FF2B5EF4-FFF2-40B4-BE49-F238E27FC236}">
+                <a16:creationId xmlns:a16="http://schemas.microsoft.com/office/drawing/2014/main" id="{1187FB64-1B5F-406B-B4F1-E2A992B5AF58}"/>
+              </a:ext>
+            </a:extLst>
+          </p:cNvPr>
+          <p:cNvPicPr>
+            <a:picLocks noChangeAspect="1"/>
+          </p:cNvPicPr>
+          <p:nvPr/>
+        </p:nvPicPr>
+        <p:blipFill>
+          <a:blip r:embed="rId4"/>
+          <a:stretch>
+            <a:fillRect/>
+          </a:stretch>
+        </p:blipFill>
+        <p:spPr>
+          <a:xfrm>
+            <a:off x="781531" y="1660281"/>
+            <a:ext cx="4338157" cy="3207693"/>
+          </a:xfrm>
+          <a:prstGeom prst="rect">
+            <a:avLst/>
+          </a:prstGeom>
+        </p:spPr>
+      </p:pic>
+    </p:spTree>
+    <p:extLst>
+      <p:ext uri="{BB962C8B-B14F-4D97-AF65-F5344CB8AC3E}">
+        <p14:creationId xmlns:p14="http://schemas.microsoft.com/office/powerpoint/2010/main" val="1739264895"/>
       </p:ext>
     </p:extLst>
   </p:cSld>

</xml_diff>